<commit_message>
Added the Capston_Sprint2.ipynb notebook which has logistic regression performed. Renamed earlier Capstone.ipynb as Capstone_Sprint1.ipynb. Removed earlier versions of presentations
</commit_message>
<xml_diff>
--- a/Sprint2 Dec14.pptx
+++ b/Sprint2 Dec14.pptx
@@ -120,6 +120,46 @@
 
 <file path=ppt/changesInfos/changesInfo1.xml><?xml version="1.0" encoding="utf-8"?>
 <pc:chgInfo xmlns:a="http://schemas.openxmlformats.org/drawingml/2006/main" xmlns:r="http://schemas.openxmlformats.org/officeDocument/2006/relationships" xmlns:ac="http://schemas.microsoft.com/office/drawing/2013/main/command" xmlns:pc="http://schemas.microsoft.com/office/powerpoint/2013/main/command">
+  <pc:docChgLst>
+    <pc:chgData name="Vidyasagar Botcha" userId="240f3d197f7be7fa" providerId="LiveId" clId="{4BDF97B0-8D4E-4FB0-9E42-BA0F8A762951}"/>
+    <pc:docChg chg="custSel modSld">
+      <pc:chgData name="Vidyasagar Botcha" userId="240f3d197f7be7fa" providerId="LiveId" clId="{4BDF97B0-8D4E-4FB0-9E42-BA0F8A762951}" dt="2023-12-15T17:11:40.749" v="11" actId="20577"/>
+      <pc:docMkLst>
+        <pc:docMk/>
+      </pc:docMkLst>
+      <pc:sldChg chg="addSp delSp modSp mod">
+        <pc:chgData name="Vidyasagar Botcha" userId="240f3d197f7be7fa" providerId="LiveId" clId="{4BDF97B0-8D4E-4FB0-9E42-BA0F8A762951}" dt="2023-12-15T17:11:40.749" v="11" actId="20577"/>
+        <pc:sldMkLst>
+          <pc:docMk/>
+          <pc:sldMk cId="3514813499" sldId="280"/>
+        </pc:sldMkLst>
+        <pc:spChg chg="mod">
+          <ac:chgData name="Vidyasagar Botcha" userId="240f3d197f7be7fa" providerId="LiveId" clId="{4BDF97B0-8D4E-4FB0-9E42-BA0F8A762951}" dt="2023-12-15T17:11:40.749" v="11" actId="20577"/>
+          <ac:spMkLst>
+            <pc:docMk/>
+            <pc:sldMk cId="3514813499" sldId="280"/>
+            <ac:spMk id="3" creationId="{D4FF4741-2C35-7F92-9377-D2A140A64E9A}"/>
+          </ac:spMkLst>
+        </pc:spChg>
+        <pc:spChg chg="del">
+          <ac:chgData name="Vidyasagar Botcha" userId="240f3d197f7be7fa" providerId="LiveId" clId="{4BDF97B0-8D4E-4FB0-9E42-BA0F8A762951}" dt="2023-12-15T17:11:24.644" v="0" actId="478"/>
+          <ac:spMkLst>
+            <pc:docMk/>
+            <pc:sldMk cId="3514813499" sldId="280"/>
+            <ac:spMk id="4" creationId="{7B7BE0DE-DE90-5AA5-0F72-138DC33EEE7D}"/>
+          </ac:spMkLst>
+        </pc:spChg>
+        <pc:picChg chg="add mod">
+          <ac:chgData name="Vidyasagar Botcha" userId="240f3d197f7be7fa" providerId="LiveId" clId="{4BDF97B0-8D4E-4FB0-9E42-BA0F8A762951}" dt="2023-12-15T17:11:28.735" v="2" actId="1076"/>
+          <ac:picMkLst>
+            <pc:docMk/>
+            <pc:sldMk cId="3514813499" sldId="280"/>
+            <ac:picMk id="1026" creationId="{4E62B3B5-8A15-230A-59E5-4138471717AA}"/>
+          </ac:picMkLst>
+        </pc:picChg>
+      </pc:sldChg>
+    </pc:docChg>
+  </pc:docChgLst>
   <pc:docChgLst>
     <pc:chgData name="Vidyasagar Botcha" userId="240f3d197f7be7fa" providerId="LiveId" clId="{65EBC9DF-D69B-49CB-9530-668BD0BAD7E2}"/>
     <pc:docChg chg="undo redo custSel addSld delSld modSld">
@@ -6802,7 +6842,7 @@
           <a:p>
             <a:fld id="{4C85C6B4-8F7B-4FA9-BDAA-7F02421F6AD7}" type="datetimeFigureOut">
               <a:rPr lang="en-GB" smtClean="0"/>
-              <a:t>14/12/2023</a:t>
+              <a:t>15/12/2023</a:t>
             </a:fld>
             <a:endParaRPr lang="en-GB"/>
           </a:p>
@@ -7053,7 +7093,7 @@
           <a:p>
             <a:fld id="{4C85C6B4-8F7B-4FA9-BDAA-7F02421F6AD7}" type="datetimeFigureOut">
               <a:rPr lang="en-GB" smtClean="0"/>
-              <a:t>14/12/2023</a:t>
+              <a:t>15/12/2023</a:t>
             </a:fld>
             <a:endParaRPr lang="en-GB"/>
           </a:p>
@@ -7367,7 +7407,7 @@
           <a:p>
             <a:fld id="{4C85C6B4-8F7B-4FA9-BDAA-7F02421F6AD7}" type="datetimeFigureOut">
               <a:rPr lang="en-GB" smtClean="0"/>
-              <a:t>14/12/2023</a:t>
+              <a:t>15/12/2023</a:t>
             </a:fld>
             <a:endParaRPr lang="en-GB"/>
           </a:p>
@@ -7708,7 +7748,7 @@
           <a:p>
             <a:fld id="{4C85C6B4-8F7B-4FA9-BDAA-7F02421F6AD7}" type="datetimeFigureOut">
               <a:rPr lang="en-GB" smtClean="0"/>
-              <a:t>14/12/2023</a:t>
+              <a:t>15/12/2023</a:t>
             </a:fld>
             <a:endParaRPr lang="en-GB"/>
           </a:p>
@@ -8022,7 +8062,7 @@
           <a:p>
             <a:fld id="{4C85C6B4-8F7B-4FA9-BDAA-7F02421F6AD7}" type="datetimeFigureOut">
               <a:rPr lang="en-GB" smtClean="0"/>
-              <a:t>14/12/2023</a:t>
+              <a:t>15/12/2023</a:t>
             </a:fld>
             <a:endParaRPr lang="en-GB"/>
           </a:p>
@@ -8415,7 +8455,7 @@
           <a:p>
             <a:fld id="{4C85C6B4-8F7B-4FA9-BDAA-7F02421F6AD7}" type="datetimeFigureOut">
               <a:rPr lang="en-GB" smtClean="0"/>
-              <a:t>14/12/2023</a:t>
+              <a:t>15/12/2023</a:t>
             </a:fld>
             <a:endParaRPr lang="en-GB"/>
           </a:p>
@@ -8585,7 +8625,7 @@
           <a:p>
             <a:fld id="{4C85C6B4-8F7B-4FA9-BDAA-7F02421F6AD7}" type="datetimeFigureOut">
               <a:rPr lang="en-GB" smtClean="0"/>
-              <a:t>14/12/2023</a:t>
+              <a:t>15/12/2023</a:t>
             </a:fld>
             <a:endParaRPr lang="en-GB"/>
           </a:p>
@@ -8765,7 +8805,7 @@
           <a:p>
             <a:fld id="{4C85C6B4-8F7B-4FA9-BDAA-7F02421F6AD7}" type="datetimeFigureOut">
               <a:rPr lang="en-GB" smtClean="0"/>
-              <a:t>14/12/2023</a:t>
+              <a:t>15/12/2023</a:t>
             </a:fld>
             <a:endParaRPr lang="en-GB"/>
           </a:p>
@@ -8941,7 +8981,7 @@
           <a:p>
             <a:fld id="{4C85C6B4-8F7B-4FA9-BDAA-7F02421F6AD7}" type="datetimeFigureOut">
               <a:rPr lang="en-GB" smtClean="0"/>
-              <a:t>14/12/2023</a:t>
+              <a:t>15/12/2023</a:t>
             </a:fld>
             <a:endParaRPr lang="en-GB"/>
           </a:p>
@@ -9188,7 +9228,7 @@
           <a:p>
             <a:fld id="{4C85C6B4-8F7B-4FA9-BDAA-7F02421F6AD7}" type="datetimeFigureOut">
               <a:rPr lang="en-GB" smtClean="0"/>
-              <a:t>14/12/2023</a:t>
+              <a:t>15/12/2023</a:t>
             </a:fld>
             <a:endParaRPr lang="en-GB"/>
           </a:p>
@@ -9420,7 +9460,7 @@
           <a:p>
             <a:fld id="{4C85C6B4-8F7B-4FA9-BDAA-7F02421F6AD7}" type="datetimeFigureOut">
               <a:rPr lang="en-GB" smtClean="0"/>
-              <a:t>14/12/2023</a:t>
+              <a:t>15/12/2023</a:t>
             </a:fld>
             <a:endParaRPr lang="en-GB"/>
           </a:p>
@@ -9794,7 +9834,7 @@
           <a:p>
             <a:fld id="{4C85C6B4-8F7B-4FA9-BDAA-7F02421F6AD7}" type="datetimeFigureOut">
               <a:rPr lang="en-GB" smtClean="0"/>
-              <a:t>14/12/2023</a:t>
+              <a:t>15/12/2023</a:t>
             </a:fld>
             <a:endParaRPr lang="en-GB"/>
           </a:p>
@@ -9917,7 +9957,7 @@
           <a:p>
             <a:fld id="{4C85C6B4-8F7B-4FA9-BDAA-7F02421F6AD7}" type="datetimeFigureOut">
               <a:rPr lang="en-GB" smtClean="0"/>
-              <a:t>14/12/2023</a:t>
+              <a:t>15/12/2023</a:t>
             </a:fld>
             <a:endParaRPr lang="en-GB"/>
           </a:p>
@@ -10012,7 +10052,7 @@
           <a:p>
             <a:fld id="{4C85C6B4-8F7B-4FA9-BDAA-7F02421F6AD7}" type="datetimeFigureOut">
               <a:rPr lang="en-GB" smtClean="0"/>
-              <a:t>14/12/2023</a:t>
+              <a:t>15/12/2023</a:t>
             </a:fld>
             <a:endParaRPr lang="en-GB"/>
           </a:p>
@@ -10267,7 +10307,7 @@
           <a:p>
             <a:fld id="{4C85C6B4-8F7B-4FA9-BDAA-7F02421F6AD7}" type="datetimeFigureOut">
               <a:rPr lang="en-GB" smtClean="0"/>
-              <a:t>14/12/2023</a:t>
+              <a:t>15/12/2023</a:t>
             </a:fld>
             <a:endParaRPr lang="en-GB"/>
           </a:p>
@@ -10530,7 +10570,7 @@
           <a:p>
             <a:fld id="{4C85C6B4-8F7B-4FA9-BDAA-7F02421F6AD7}" type="datetimeFigureOut">
               <a:rPr lang="en-GB" smtClean="0"/>
-              <a:t>14/12/2023</a:t>
+              <a:t>15/12/2023</a:t>
             </a:fld>
             <a:endParaRPr lang="en-GB"/>
           </a:p>
@@ -11273,7 +11313,7 @@
           <a:p>
             <a:fld id="{4C85C6B4-8F7B-4FA9-BDAA-7F02421F6AD7}" type="datetimeFigureOut">
               <a:rPr lang="en-GB" smtClean="0"/>
-              <a:t>14/12/2023</a:t>
+              <a:t>15/12/2023</a:t>
             </a:fld>
             <a:endParaRPr lang="en-GB"/>
           </a:p>
@@ -13569,35 +13609,63 @@
               <a:rPr lang="en-US" dirty="0"/>
               <a:t>All features</a:t>
             </a:r>
+          </a:p>
+          <a:p>
+            <a:r>
+              <a:rPr lang="en-US" dirty="0"/>
+              <a:t>C- Value</a:t>
+            </a:r>
             <a:endParaRPr lang="en-GB" dirty="0"/>
           </a:p>
         </p:txBody>
       </p:sp>
-      <p:sp>
-        <p:nvSpPr>
-          <p:cNvPr id="4" name="Content Placeholder 3">
+      <p:pic>
+        <p:nvPicPr>
+          <p:cNvPr id="1026" name="Picture 2">
             <a:extLst>
               <a:ext uri="{FF2B5EF4-FFF2-40B4-BE49-F238E27FC236}">
-                <a16:creationId xmlns:a16="http://schemas.microsoft.com/office/drawing/2014/main" id="{7B7BE0DE-DE90-5AA5-0F72-138DC33EEE7D}"/>
+                <a16:creationId xmlns:a16="http://schemas.microsoft.com/office/drawing/2014/main" id="{4E62B3B5-8A15-230A-59E5-4138471717AA}"/>
               </a:ext>
             </a:extLst>
           </p:cNvPr>
-          <p:cNvSpPr>
-            <a:spLocks noGrp="1"/>
-          </p:cNvSpPr>
-          <p:nvPr>
-            <p:ph sz="half" idx="2"/>
-          </p:nvPr>
-        </p:nvSpPr>
-        <p:spPr/>
-        <p:txBody>
-          <a:bodyPr/>
-          <a:lstStyle/>
-          <a:p>
-            <a:endParaRPr lang="en-GB"/>
-          </a:p>
-        </p:txBody>
-      </p:sp>
+          <p:cNvPicPr>
+            <a:picLocks noChangeAspect="1" noChangeArrowheads="1"/>
+          </p:cNvPicPr>
+          <p:nvPr/>
+        </p:nvPicPr>
+        <p:blipFill>
+          <a:blip r:embed="rId2">
+            <a:extLst>
+              <a:ext uri="{28A0092B-C50C-407E-A947-70E740481C1C}">
+                <a14:useLocalDpi xmlns:a14="http://schemas.microsoft.com/office/drawing/2010/main" val="0"/>
+              </a:ext>
+            </a:extLst>
+          </a:blip>
+          <a:srcRect/>
+          <a:stretch>
+            <a:fillRect/>
+          </a:stretch>
+        </p:blipFill>
+        <p:spPr bwMode="auto">
+          <a:xfrm>
+            <a:off x="2993501" y="2271615"/>
+            <a:ext cx="5695950" cy="4162425"/>
+          </a:xfrm>
+          <a:prstGeom prst="rect">
+            <a:avLst/>
+          </a:prstGeom>
+          <a:noFill/>
+          <a:extLst>
+            <a:ext uri="{909E8E84-426E-40DD-AFC4-6F175D3DCCD1}">
+              <a14:hiddenFill xmlns:a14="http://schemas.microsoft.com/office/drawing/2010/main">
+                <a:solidFill>
+                  <a:srgbClr val="FFFFFF"/>
+                </a:solidFill>
+              </a14:hiddenFill>
+            </a:ext>
+          </a:extLst>
+        </p:spPr>
+      </p:pic>
     </p:spTree>
     <p:extLst>
       <p:ext uri="{BB962C8B-B14F-4D97-AF65-F5344CB8AC3E}">

</xml_diff>